<commit_message>
Finish smooth movement and rotation of the tank using a joystick control
</commit_message>
<xml_diff>
--- a/app/src/Tank Images.pptx
+++ b/app/src/Tank Images.pptx
@@ -259,7 +259,7 @@
           <a:p>
             <a:fld id="{6CEAB757-8E6E-4ABD-BC45-881DC5CE9DE2}" type="datetimeFigureOut">
               <a:rPr lang="en-US" smtClean="0"/>
-              <a:t>2018-10-23</a:t>
+              <a:t>2018-10-30</a:t>
             </a:fld>
             <a:endParaRPr lang="en-US"/>
           </a:p>
@@ -457,7 +457,7 @@
           <a:p>
             <a:fld id="{6CEAB757-8E6E-4ABD-BC45-881DC5CE9DE2}" type="datetimeFigureOut">
               <a:rPr lang="en-US" smtClean="0"/>
-              <a:t>2018-10-23</a:t>
+              <a:t>2018-10-30</a:t>
             </a:fld>
             <a:endParaRPr lang="en-US"/>
           </a:p>
@@ -665,7 +665,7 @@
           <a:p>
             <a:fld id="{6CEAB757-8E6E-4ABD-BC45-881DC5CE9DE2}" type="datetimeFigureOut">
               <a:rPr lang="en-US" smtClean="0"/>
-              <a:t>2018-10-23</a:t>
+              <a:t>2018-10-30</a:t>
             </a:fld>
             <a:endParaRPr lang="en-US"/>
           </a:p>
@@ -863,7 +863,7 @@
           <a:p>
             <a:fld id="{6CEAB757-8E6E-4ABD-BC45-881DC5CE9DE2}" type="datetimeFigureOut">
               <a:rPr lang="en-US" smtClean="0"/>
-              <a:t>2018-10-23</a:t>
+              <a:t>2018-10-30</a:t>
             </a:fld>
             <a:endParaRPr lang="en-US"/>
           </a:p>
@@ -1138,7 +1138,7 @@
           <a:p>
             <a:fld id="{6CEAB757-8E6E-4ABD-BC45-881DC5CE9DE2}" type="datetimeFigureOut">
               <a:rPr lang="en-US" smtClean="0"/>
-              <a:t>2018-10-23</a:t>
+              <a:t>2018-10-30</a:t>
             </a:fld>
             <a:endParaRPr lang="en-US"/>
           </a:p>
@@ -1403,7 +1403,7 @@
           <a:p>
             <a:fld id="{6CEAB757-8E6E-4ABD-BC45-881DC5CE9DE2}" type="datetimeFigureOut">
               <a:rPr lang="en-US" smtClean="0"/>
-              <a:t>2018-10-23</a:t>
+              <a:t>2018-10-30</a:t>
             </a:fld>
             <a:endParaRPr lang="en-US"/>
           </a:p>
@@ -1815,7 +1815,7 @@
           <a:p>
             <a:fld id="{6CEAB757-8E6E-4ABD-BC45-881DC5CE9DE2}" type="datetimeFigureOut">
               <a:rPr lang="en-US" smtClean="0"/>
-              <a:t>2018-10-23</a:t>
+              <a:t>2018-10-30</a:t>
             </a:fld>
             <a:endParaRPr lang="en-US"/>
           </a:p>
@@ -1956,7 +1956,7 @@
           <a:p>
             <a:fld id="{6CEAB757-8E6E-4ABD-BC45-881DC5CE9DE2}" type="datetimeFigureOut">
               <a:rPr lang="en-US" smtClean="0"/>
-              <a:t>2018-10-23</a:t>
+              <a:t>2018-10-30</a:t>
             </a:fld>
             <a:endParaRPr lang="en-US"/>
           </a:p>
@@ -2069,7 +2069,7 @@
           <a:p>
             <a:fld id="{6CEAB757-8E6E-4ABD-BC45-881DC5CE9DE2}" type="datetimeFigureOut">
               <a:rPr lang="en-US" smtClean="0"/>
-              <a:t>2018-10-23</a:t>
+              <a:t>2018-10-30</a:t>
             </a:fld>
             <a:endParaRPr lang="en-US"/>
           </a:p>
@@ -2380,7 +2380,7 @@
           <a:p>
             <a:fld id="{6CEAB757-8E6E-4ABD-BC45-881DC5CE9DE2}" type="datetimeFigureOut">
               <a:rPr lang="en-US" smtClean="0"/>
-              <a:t>2018-10-23</a:t>
+              <a:t>2018-10-30</a:t>
             </a:fld>
             <a:endParaRPr lang="en-US"/>
           </a:p>
@@ -2668,7 +2668,7 @@
           <a:p>
             <a:fld id="{6CEAB757-8E6E-4ABD-BC45-881DC5CE9DE2}" type="datetimeFigureOut">
               <a:rPr lang="en-US" smtClean="0"/>
-              <a:t>2018-10-23</a:t>
+              <a:t>2018-10-30</a:t>
             </a:fld>
             <a:endParaRPr lang="en-US"/>
           </a:p>
@@ -2909,7 +2909,7 @@
           <a:p>
             <a:fld id="{6CEAB757-8E6E-4ABD-BC45-881DC5CE9DE2}" type="datetimeFigureOut">
               <a:rPr lang="en-US" smtClean="0"/>
-              <a:t>2018-10-23</a:t>
+              <a:t>2018-10-30</a:t>
             </a:fld>
             <a:endParaRPr lang="en-US"/>
           </a:p>
@@ -3364,10 +3364,10 @@
       </p:pic>
       <p:grpSp>
         <p:nvGrpSpPr>
-          <p:cNvPr id="12" name="Group 11">
-            <a:extLst>
-              <a:ext uri="{FF2B5EF4-FFF2-40B4-BE49-F238E27FC236}">
-                <a16:creationId xmlns:a16="http://schemas.microsoft.com/office/drawing/2014/main" id="{564321A3-B839-4622-B94E-871682FD3FD6}"/>
+          <p:cNvPr id="2" name="Group 1">
+            <a:extLst>
+              <a:ext uri="{FF2B5EF4-FFF2-40B4-BE49-F238E27FC236}">
+                <a16:creationId xmlns:a16="http://schemas.microsoft.com/office/drawing/2014/main" id="{A7FBD921-45B5-40FA-A540-BA63C871116A}"/>
               </a:ext>
             </a:extLst>
           </p:cNvPr>
@@ -3377,9 +3377,9 @@
         <p:grpSpPr>
           <a:xfrm>
             <a:off x="5202309" y="2405342"/>
-            <a:ext cx="1045045" cy="566977"/>
-            <a:chOff x="6261937" y="2120265"/>
-            <a:chExt cx="1045045" cy="566977"/>
+            <a:ext cx="973045" cy="566977"/>
+            <a:chOff x="5202309" y="2405342"/>
+            <a:chExt cx="973045" cy="566977"/>
           </a:xfrm>
         </p:grpSpPr>
         <p:grpSp>
@@ -3396,10 +3396,10 @@
           </p:nvGrpSpPr>
           <p:grpSpPr>
             <a:xfrm>
-              <a:off x="6261937" y="2120265"/>
-              <a:ext cx="1045045" cy="566977"/>
+              <a:off x="5202309" y="2405342"/>
+              <a:ext cx="973045" cy="566977"/>
               <a:chOff x="1908051" y="2439046"/>
-              <a:chExt cx="1045045" cy="566977"/>
+              <a:chExt cx="973045" cy="566977"/>
             </a:xfrm>
           </p:grpSpPr>
           <p:grpSp>
@@ -3417,9 +3417,9 @@
             <p:grpSpPr>
               <a:xfrm>
                 <a:off x="1908051" y="2439046"/>
-                <a:ext cx="1045045" cy="566977"/>
+                <a:ext cx="973045" cy="566977"/>
                 <a:chOff x="1908051" y="2439046"/>
-                <a:chExt cx="1045045" cy="566977"/>
+                <a:chExt cx="973045" cy="566977"/>
               </a:xfrm>
             </p:grpSpPr>
             <p:sp>
@@ -3437,7 +3437,7 @@
               <p:spPr>
                 <a:xfrm>
                   <a:off x="1908051" y="2439046"/>
-                  <a:ext cx="900000" cy="566977"/>
+                  <a:ext cx="828000" cy="566977"/>
                 </a:xfrm>
                 <a:prstGeom prst="rect">
                   <a:avLst/>
@@ -3495,7 +3495,7 @@
               <p:spPr>
                 <a:xfrm>
                   <a:off x="2377096" y="2666279"/>
-                  <a:ext cx="576000" cy="108000"/>
+                  <a:ext cx="504000" cy="108000"/>
                 </a:xfrm>
                 <a:prstGeom prst="rect">
                   <a:avLst/>
@@ -3549,7 +3549,7 @@
             </p:nvSpPr>
             <p:spPr>
               <a:xfrm>
-                <a:off x="2160051" y="2522279"/>
+                <a:off x="2124051" y="2522279"/>
                 <a:ext cx="396000" cy="396000"/>
               </a:xfrm>
               <a:prstGeom prst="ellipse">
@@ -3604,8 +3604,8 @@
           </p:nvSpPr>
           <p:spPr>
             <a:xfrm>
-              <a:off x="6730982" y="2359643"/>
-              <a:ext cx="504000" cy="86400"/>
+              <a:off x="5694100" y="2650575"/>
+              <a:ext cx="360000" cy="86400"/>
             </a:xfrm>
             <a:prstGeom prst="rect">
               <a:avLst/>
@@ -3645,10 +3645,10 @@
       </p:grpSp>
       <p:grpSp>
         <p:nvGrpSpPr>
-          <p:cNvPr id="13" name="Group 12">
-            <a:extLst>
-              <a:ext uri="{FF2B5EF4-FFF2-40B4-BE49-F238E27FC236}">
-                <a16:creationId xmlns:a16="http://schemas.microsoft.com/office/drawing/2014/main" id="{9DC312A1-2BD0-4235-A29C-70DDC1087206}"/>
+          <p:cNvPr id="26" name="Group 25">
+            <a:extLst>
+              <a:ext uri="{FF2B5EF4-FFF2-40B4-BE49-F238E27FC236}">
+                <a16:creationId xmlns:a16="http://schemas.microsoft.com/office/drawing/2014/main" id="{6A916A89-CF79-4C84-A061-DE68DD178832}"/>
               </a:ext>
             </a:extLst>
           </p:cNvPr>
@@ -3657,10 +3657,10 @@
         </p:nvGrpSpPr>
         <p:grpSpPr>
           <a:xfrm>
-            <a:off x="5129786" y="3550449"/>
-            <a:ext cx="1045045" cy="566977"/>
-            <a:chOff x="6261937" y="2120265"/>
-            <a:chExt cx="1045045" cy="566977"/>
+            <a:off x="5202309" y="1675314"/>
+            <a:ext cx="973045" cy="566977"/>
+            <a:chOff x="5202309" y="2405342"/>
+            <a:chExt cx="973045" cy="566977"/>
           </a:xfrm>
           <a:solidFill>
             <a:srgbClr val="4F79FF"/>
@@ -3668,10 +3668,10 @@
         </p:grpSpPr>
         <p:grpSp>
           <p:nvGrpSpPr>
-            <p:cNvPr id="14" name="Group 13">
+            <p:cNvPr id="27" name="Group 26">
               <a:extLst>
                 <a:ext uri="{FF2B5EF4-FFF2-40B4-BE49-F238E27FC236}">
-                  <a16:creationId xmlns:a16="http://schemas.microsoft.com/office/drawing/2014/main" id="{FC027251-C447-4C43-96C3-29A436AC68C1}"/>
+                  <a16:creationId xmlns:a16="http://schemas.microsoft.com/office/drawing/2014/main" id="{7F8BFEEE-F133-4680-B834-707F9A1C0A65}"/>
                 </a:ext>
               </a:extLst>
             </p:cNvPr>
@@ -3680,19 +3680,19 @@
           </p:nvGrpSpPr>
           <p:grpSpPr>
             <a:xfrm>
-              <a:off x="6261937" y="2120265"/>
-              <a:ext cx="1045045" cy="566977"/>
+              <a:off x="5202309" y="2405342"/>
+              <a:ext cx="973045" cy="566977"/>
               <a:chOff x="1908051" y="2439046"/>
-              <a:chExt cx="1045045" cy="566977"/>
+              <a:chExt cx="973045" cy="566977"/>
             </a:xfrm>
             <a:grpFill/>
           </p:grpSpPr>
           <p:grpSp>
             <p:nvGrpSpPr>
-              <p:cNvPr id="16" name="Group 15">
+              <p:cNvPr id="29" name="Group 28">
                 <a:extLst>
                   <a:ext uri="{FF2B5EF4-FFF2-40B4-BE49-F238E27FC236}">
-                    <a16:creationId xmlns:a16="http://schemas.microsoft.com/office/drawing/2014/main" id="{E530ED3A-67C2-4170-AFFC-7AB3DBAB2D84}"/>
+                    <a16:creationId xmlns:a16="http://schemas.microsoft.com/office/drawing/2014/main" id="{29DDE60E-22D2-4693-B8DD-E9916118B48F}"/>
                   </a:ext>
                 </a:extLst>
               </p:cNvPr>
@@ -3702,18 +3702,18 @@
             <p:grpSpPr>
               <a:xfrm>
                 <a:off x="1908051" y="2439046"/>
-                <a:ext cx="1045045" cy="566977"/>
+                <a:ext cx="973045" cy="566977"/>
                 <a:chOff x="1908051" y="2439046"/>
-                <a:chExt cx="1045045" cy="566977"/>
+                <a:chExt cx="973045" cy="566977"/>
               </a:xfrm>
               <a:grpFill/>
             </p:grpSpPr>
             <p:sp>
               <p:nvSpPr>
-                <p:cNvPr id="18" name="Rectangle 17">
+                <p:cNvPr id="31" name="Rectangle 30">
                   <a:extLst>
                     <a:ext uri="{FF2B5EF4-FFF2-40B4-BE49-F238E27FC236}">
-                      <a16:creationId xmlns:a16="http://schemas.microsoft.com/office/drawing/2014/main" id="{68E2BE4F-9F23-49B3-B867-AAC221207935}"/>
+                      <a16:creationId xmlns:a16="http://schemas.microsoft.com/office/drawing/2014/main" id="{A1000345-1A3D-4F9E-938D-C54C112FB94E}"/>
                     </a:ext>
                   </a:extLst>
                 </p:cNvPr>
@@ -3723,7 +3723,7 @@
               <p:spPr>
                 <a:xfrm>
                   <a:off x="1908051" y="2439046"/>
-                  <a:ext cx="900000" cy="566977"/>
+                  <a:ext cx="828000" cy="566977"/>
                 </a:xfrm>
                 <a:prstGeom prst="rect">
                   <a:avLst/>
@@ -3766,10 +3766,10 @@
             </p:sp>
             <p:sp>
               <p:nvSpPr>
-                <p:cNvPr id="19" name="Rectangle 18">
+                <p:cNvPr id="32" name="Rectangle 31">
                   <a:extLst>
                     <a:ext uri="{FF2B5EF4-FFF2-40B4-BE49-F238E27FC236}">
-                      <a16:creationId xmlns:a16="http://schemas.microsoft.com/office/drawing/2014/main" id="{BEA14A7B-DD05-4CA3-949F-7923005DA3C3}"/>
+                      <a16:creationId xmlns:a16="http://schemas.microsoft.com/office/drawing/2014/main" id="{EC0260B2-175B-4C9C-BF89-8395A40AD1B2}"/>
                     </a:ext>
                   </a:extLst>
                 </p:cNvPr>
@@ -3779,7 +3779,7 @@
               <p:spPr>
                 <a:xfrm>
                   <a:off x="2377096" y="2666279"/>
-                  <a:ext cx="576000" cy="108000"/>
+                  <a:ext cx="504000" cy="108000"/>
                 </a:xfrm>
                 <a:prstGeom prst="rect">
                   <a:avLst/>
@@ -3819,10 +3819,10 @@
           </p:grpSp>
           <p:sp>
             <p:nvSpPr>
-              <p:cNvPr id="17" name="Oval 16">
+              <p:cNvPr id="30" name="Oval 29">
                 <a:extLst>
                   <a:ext uri="{FF2B5EF4-FFF2-40B4-BE49-F238E27FC236}">
-                    <a16:creationId xmlns:a16="http://schemas.microsoft.com/office/drawing/2014/main" id="{81657506-E2D8-4B7A-A864-3F25C9D552EF}"/>
+                    <a16:creationId xmlns:a16="http://schemas.microsoft.com/office/drawing/2014/main" id="{6B4E12BE-F1C2-4D74-B144-727B2FE6ED8D}"/>
                   </a:ext>
                 </a:extLst>
               </p:cNvPr>
@@ -3831,7 +3831,7 @@
             </p:nvSpPr>
             <p:spPr>
               <a:xfrm>
-                <a:off x="2160051" y="2522279"/>
+                <a:off x="2124051" y="2522279"/>
                 <a:ext cx="396000" cy="396000"/>
               </a:xfrm>
               <a:prstGeom prst="ellipse">
@@ -3872,10 +3872,10 @@
         </p:grpSp>
         <p:sp>
           <p:nvSpPr>
-            <p:cNvPr id="15" name="Rectangle 14">
+            <p:cNvPr id="28" name="Rectangle 27">
               <a:extLst>
                 <a:ext uri="{FF2B5EF4-FFF2-40B4-BE49-F238E27FC236}">
-                  <a16:creationId xmlns:a16="http://schemas.microsoft.com/office/drawing/2014/main" id="{872105AF-2A37-44CA-9A19-423EB069C73C}"/>
+                  <a16:creationId xmlns:a16="http://schemas.microsoft.com/office/drawing/2014/main" id="{E08DA51E-D755-450F-8D88-55435468607E}"/>
                 </a:ext>
               </a:extLst>
             </p:cNvPr>
@@ -3884,8 +3884,8 @@
           </p:nvSpPr>
           <p:spPr>
             <a:xfrm>
-              <a:off x="6730982" y="2359643"/>
-              <a:ext cx="504000" cy="86400"/>
+              <a:off x="5694100" y="2650575"/>
+              <a:ext cx="360000" cy="82800"/>
             </a:xfrm>
             <a:prstGeom prst="rect">
               <a:avLst/>
@@ -3923,10 +3923,10 @@
       </p:grpSp>
       <p:pic>
         <p:nvPicPr>
-          <p:cNvPr id="3" name="Picture 2">
-            <a:extLst>
-              <a:ext uri="{FF2B5EF4-FFF2-40B4-BE49-F238E27FC236}">
-                <a16:creationId xmlns:a16="http://schemas.microsoft.com/office/drawing/2014/main" id="{AB044A10-1EC7-4902-9BDD-762312500803}"/>
+          <p:cNvPr id="54" name="Picture 53">
+            <a:extLst>
+              <a:ext uri="{FF2B5EF4-FFF2-40B4-BE49-F238E27FC236}">
+                <a16:creationId xmlns:a16="http://schemas.microsoft.com/office/drawing/2014/main" id="{1B4E6432-27FE-42A7-A381-2F403B7108D4}"/>
               </a:ext>
             </a:extLst>
           </p:cNvPr>
@@ -3936,21 +3936,15 @@
           <p:nvPr/>
         </p:nvPicPr>
         <p:blipFill>
-          <a:blip r:embed="rId3">
-            <a:extLst>
-              <a:ext uri="{28A0092B-C50C-407E-A947-70E740481C1C}">
-                <a14:useLocalDpi xmlns:a14="http://schemas.microsoft.com/office/drawing/2010/main" val="0"/>
-              </a:ext>
-            </a:extLst>
-          </a:blip>
+          <a:blip r:embed="rId3"/>
           <a:stretch>
             <a:fillRect/>
           </a:stretch>
         </p:blipFill>
         <p:spPr>
           <a:xfrm>
-            <a:off x="6683293" y="3626755"/>
-            <a:ext cx="324000" cy="179390"/>
+            <a:off x="7379855" y="2635740"/>
+            <a:ext cx="303060" cy="180000"/>
           </a:xfrm>
           <a:prstGeom prst="rect">
             <a:avLst/>
@@ -3959,10 +3953,10 @@
       </p:pic>
       <p:pic>
         <p:nvPicPr>
-          <p:cNvPr id="20" name="Picture 19">
-            <a:extLst>
-              <a:ext uri="{FF2B5EF4-FFF2-40B4-BE49-F238E27FC236}">
-                <a16:creationId xmlns:a16="http://schemas.microsoft.com/office/drawing/2014/main" id="{37BFBAF9-BF6C-4DE6-998F-9BB323E7B4B4}"/>
+          <p:cNvPr id="69" name="Picture 68">
+            <a:extLst>
+              <a:ext uri="{FF2B5EF4-FFF2-40B4-BE49-F238E27FC236}">
+                <a16:creationId xmlns:a16="http://schemas.microsoft.com/office/drawing/2014/main" id="{0F04C0D8-1FBF-4FB5-97A9-269DF806EBC5}"/>
               </a:ext>
             </a:extLst>
           </p:cNvPr>
@@ -3972,21 +3966,15 @@
           <p:nvPr/>
         </p:nvPicPr>
         <p:blipFill>
-          <a:blip r:embed="rId4">
-            <a:extLst>
-              <a:ext uri="{28A0092B-C50C-407E-A947-70E740481C1C}">
-                <a14:useLocalDpi xmlns:a14="http://schemas.microsoft.com/office/drawing/2010/main" val="0"/>
-              </a:ext>
-            </a:extLst>
-          </a:blip>
+          <a:blip r:embed="rId4"/>
           <a:stretch>
             <a:fillRect/>
           </a:stretch>
         </p:blipFill>
         <p:spPr>
           <a:xfrm>
-            <a:off x="6683293" y="3338795"/>
-            <a:ext cx="324000" cy="180410"/>
+            <a:off x="7531384" y="3862261"/>
+            <a:ext cx="303061" cy="180000"/>
           </a:xfrm>
           <a:prstGeom prst="rect">
             <a:avLst/>

</xml_diff>

<commit_message>
Change tank images and only rotate tank when needed
</commit_message>
<xml_diff>
--- a/app/src/Tank Images.pptx
+++ b/app/src/Tank Images.pptx
@@ -259,7 +259,7 @@
           <a:p>
             <a:fld id="{6CEAB757-8E6E-4ABD-BC45-881DC5CE9DE2}" type="datetimeFigureOut">
               <a:rPr lang="en-US" smtClean="0"/>
-              <a:t>2018-10-30</a:t>
+              <a:t>10/31/2018</a:t>
             </a:fld>
             <a:endParaRPr lang="en-US"/>
           </a:p>
@@ -457,7 +457,7 @@
           <a:p>
             <a:fld id="{6CEAB757-8E6E-4ABD-BC45-881DC5CE9DE2}" type="datetimeFigureOut">
               <a:rPr lang="en-US" smtClean="0"/>
-              <a:t>2018-10-30</a:t>
+              <a:t>10/31/2018</a:t>
             </a:fld>
             <a:endParaRPr lang="en-US"/>
           </a:p>
@@ -665,7 +665,7 @@
           <a:p>
             <a:fld id="{6CEAB757-8E6E-4ABD-BC45-881DC5CE9DE2}" type="datetimeFigureOut">
               <a:rPr lang="en-US" smtClean="0"/>
-              <a:t>2018-10-30</a:t>
+              <a:t>10/31/2018</a:t>
             </a:fld>
             <a:endParaRPr lang="en-US"/>
           </a:p>
@@ -863,7 +863,7 @@
           <a:p>
             <a:fld id="{6CEAB757-8E6E-4ABD-BC45-881DC5CE9DE2}" type="datetimeFigureOut">
               <a:rPr lang="en-US" smtClean="0"/>
-              <a:t>2018-10-30</a:t>
+              <a:t>10/31/2018</a:t>
             </a:fld>
             <a:endParaRPr lang="en-US"/>
           </a:p>
@@ -1138,7 +1138,7 @@
           <a:p>
             <a:fld id="{6CEAB757-8E6E-4ABD-BC45-881DC5CE9DE2}" type="datetimeFigureOut">
               <a:rPr lang="en-US" smtClean="0"/>
-              <a:t>2018-10-30</a:t>
+              <a:t>10/31/2018</a:t>
             </a:fld>
             <a:endParaRPr lang="en-US"/>
           </a:p>
@@ -1403,7 +1403,7 @@
           <a:p>
             <a:fld id="{6CEAB757-8E6E-4ABD-BC45-881DC5CE9DE2}" type="datetimeFigureOut">
               <a:rPr lang="en-US" smtClean="0"/>
-              <a:t>2018-10-30</a:t>
+              <a:t>10/31/2018</a:t>
             </a:fld>
             <a:endParaRPr lang="en-US"/>
           </a:p>
@@ -1815,7 +1815,7 @@
           <a:p>
             <a:fld id="{6CEAB757-8E6E-4ABD-BC45-881DC5CE9DE2}" type="datetimeFigureOut">
               <a:rPr lang="en-US" smtClean="0"/>
-              <a:t>2018-10-30</a:t>
+              <a:t>10/31/2018</a:t>
             </a:fld>
             <a:endParaRPr lang="en-US"/>
           </a:p>
@@ -1956,7 +1956,7 @@
           <a:p>
             <a:fld id="{6CEAB757-8E6E-4ABD-BC45-881DC5CE9DE2}" type="datetimeFigureOut">
               <a:rPr lang="en-US" smtClean="0"/>
-              <a:t>2018-10-30</a:t>
+              <a:t>10/31/2018</a:t>
             </a:fld>
             <a:endParaRPr lang="en-US"/>
           </a:p>
@@ -2069,7 +2069,7 @@
           <a:p>
             <a:fld id="{6CEAB757-8E6E-4ABD-BC45-881DC5CE9DE2}" type="datetimeFigureOut">
               <a:rPr lang="en-US" smtClean="0"/>
-              <a:t>2018-10-30</a:t>
+              <a:t>10/31/2018</a:t>
             </a:fld>
             <a:endParaRPr lang="en-US"/>
           </a:p>
@@ -2380,7 +2380,7 @@
           <a:p>
             <a:fld id="{6CEAB757-8E6E-4ABD-BC45-881DC5CE9DE2}" type="datetimeFigureOut">
               <a:rPr lang="en-US" smtClean="0"/>
-              <a:t>2018-10-30</a:t>
+              <a:t>10/31/2018</a:t>
             </a:fld>
             <a:endParaRPr lang="en-US"/>
           </a:p>
@@ -2668,7 +2668,7 @@
           <a:p>
             <a:fld id="{6CEAB757-8E6E-4ABD-BC45-881DC5CE9DE2}" type="datetimeFigureOut">
               <a:rPr lang="en-US" smtClean="0"/>
-              <a:t>2018-10-30</a:t>
+              <a:t>10/31/2018</a:t>
             </a:fld>
             <a:endParaRPr lang="en-US"/>
           </a:p>
@@ -2909,7 +2909,7 @@
           <a:p>
             <a:fld id="{6CEAB757-8E6E-4ABD-BC45-881DC5CE9DE2}" type="datetimeFigureOut">
               <a:rPr lang="en-US" smtClean="0"/>
-              <a:t>2018-10-30</a:t>
+              <a:t>10/31/2018</a:t>
             </a:fld>
             <a:endParaRPr lang="en-US"/>
           </a:p>
@@ -3944,7 +3944,7 @@
         <p:spPr>
           <a:xfrm>
             <a:off x="7379855" y="2635740"/>
-            <a:ext cx="303060" cy="180000"/>
+            <a:ext cx="242448" cy="144000"/>
           </a:xfrm>
           <a:prstGeom prst="rect">
             <a:avLst/>
@@ -3974,7 +3974,7 @@
         <p:spPr>
           <a:xfrm>
             <a:off x="7531384" y="3862261"/>
-            <a:ext cx="303061" cy="180000"/>
+            <a:ext cx="242449" cy="144000"/>
           </a:xfrm>
           <a:prstGeom prst="rect">
             <a:avLst/>

</xml_diff>

<commit_message>
Standardize positions across different screen sizes when sending location to Firebase
</commit_message>
<xml_diff>
--- a/app/src/Tank Images.pptx
+++ b/app/src/Tank Images.pptx
@@ -6,6 +6,8 @@
   </p:sldMasterIdLst>
   <p:sldIdLst>
     <p:sldId id="256" r:id="rId2"/>
+    <p:sldId id="257" r:id="rId3"/>
+    <p:sldId id="258" r:id="rId4"/>
   </p:sldIdLst>
   <p:sldSz cx="12192000" cy="6858000"/>
   <p:notesSz cx="6858000" cy="9144000"/>
@@ -259,7 +261,7 @@
           <a:p>
             <a:fld id="{6CEAB757-8E6E-4ABD-BC45-881DC5CE9DE2}" type="datetimeFigureOut">
               <a:rPr lang="en-US" smtClean="0"/>
-              <a:t>10/31/2018</a:t>
+              <a:t>2018-12-04</a:t>
             </a:fld>
             <a:endParaRPr lang="en-US"/>
           </a:p>
@@ -457,7 +459,7 @@
           <a:p>
             <a:fld id="{6CEAB757-8E6E-4ABD-BC45-881DC5CE9DE2}" type="datetimeFigureOut">
               <a:rPr lang="en-US" smtClean="0"/>
-              <a:t>10/31/2018</a:t>
+              <a:t>2018-12-04</a:t>
             </a:fld>
             <a:endParaRPr lang="en-US"/>
           </a:p>
@@ -665,7 +667,7 @@
           <a:p>
             <a:fld id="{6CEAB757-8E6E-4ABD-BC45-881DC5CE9DE2}" type="datetimeFigureOut">
               <a:rPr lang="en-US" smtClean="0"/>
-              <a:t>10/31/2018</a:t>
+              <a:t>2018-12-04</a:t>
             </a:fld>
             <a:endParaRPr lang="en-US"/>
           </a:p>
@@ -863,7 +865,7 @@
           <a:p>
             <a:fld id="{6CEAB757-8E6E-4ABD-BC45-881DC5CE9DE2}" type="datetimeFigureOut">
               <a:rPr lang="en-US" smtClean="0"/>
-              <a:t>10/31/2018</a:t>
+              <a:t>2018-12-04</a:t>
             </a:fld>
             <a:endParaRPr lang="en-US"/>
           </a:p>
@@ -1138,7 +1140,7 @@
           <a:p>
             <a:fld id="{6CEAB757-8E6E-4ABD-BC45-881DC5CE9DE2}" type="datetimeFigureOut">
               <a:rPr lang="en-US" smtClean="0"/>
-              <a:t>10/31/2018</a:t>
+              <a:t>2018-12-04</a:t>
             </a:fld>
             <a:endParaRPr lang="en-US"/>
           </a:p>
@@ -1403,7 +1405,7 @@
           <a:p>
             <a:fld id="{6CEAB757-8E6E-4ABD-BC45-881DC5CE9DE2}" type="datetimeFigureOut">
               <a:rPr lang="en-US" smtClean="0"/>
-              <a:t>10/31/2018</a:t>
+              <a:t>2018-12-04</a:t>
             </a:fld>
             <a:endParaRPr lang="en-US"/>
           </a:p>
@@ -1815,7 +1817,7 @@
           <a:p>
             <a:fld id="{6CEAB757-8E6E-4ABD-BC45-881DC5CE9DE2}" type="datetimeFigureOut">
               <a:rPr lang="en-US" smtClean="0"/>
-              <a:t>10/31/2018</a:t>
+              <a:t>2018-12-04</a:t>
             </a:fld>
             <a:endParaRPr lang="en-US"/>
           </a:p>
@@ -1956,7 +1958,7 @@
           <a:p>
             <a:fld id="{6CEAB757-8E6E-4ABD-BC45-881DC5CE9DE2}" type="datetimeFigureOut">
               <a:rPr lang="en-US" smtClean="0"/>
-              <a:t>10/31/2018</a:t>
+              <a:t>2018-12-04</a:t>
             </a:fld>
             <a:endParaRPr lang="en-US"/>
           </a:p>
@@ -2069,7 +2071,7 @@
           <a:p>
             <a:fld id="{6CEAB757-8E6E-4ABD-BC45-881DC5CE9DE2}" type="datetimeFigureOut">
               <a:rPr lang="en-US" smtClean="0"/>
-              <a:t>10/31/2018</a:t>
+              <a:t>2018-12-04</a:t>
             </a:fld>
             <a:endParaRPr lang="en-US"/>
           </a:p>
@@ -2380,7 +2382,7 @@
           <a:p>
             <a:fld id="{6CEAB757-8E6E-4ABD-BC45-881DC5CE9DE2}" type="datetimeFigureOut">
               <a:rPr lang="en-US" smtClean="0"/>
-              <a:t>10/31/2018</a:t>
+              <a:t>2018-12-04</a:t>
             </a:fld>
             <a:endParaRPr lang="en-US"/>
           </a:p>
@@ -2668,7 +2670,7 @@
           <a:p>
             <a:fld id="{6CEAB757-8E6E-4ABD-BC45-881DC5CE9DE2}" type="datetimeFigureOut">
               <a:rPr lang="en-US" smtClean="0"/>
-              <a:t>10/31/2018</a:t>
+              <a:t>2018-12-04</a:t>
             </a:fld>
             <a:endParaRPr lang="en-US"/>
           </a:p>
@@ -2909,7 +2911,7 @@
           <a:p>
             <a:fld id="{6CEAB757-8E6E-4ABD-BC45-881DC5CE9DE2}" type="datetimeFigureOut">
               <a:rPr lang="en-US" smtClean="0"/>
-              <a:t>10/31/2018</a:t>
+              <a:t>2018-12-04</a:t>
             </a:fld>
             <a:endParaRPr lang="en-US"/>
           </a:p>
@@ -3605,7 +3607,7 @@
           <p:spPr>
             <a:xfrm>
               <a:off x="5694100" y="2650575"/>
-              <a:ext cx="360000" cy="86400"/>
+              <a:ext cx="360000" cy="79200"/>
             </a:xfrm>
             <a:prstGeom prst="rect">
               <a:avLst/>
@@ -3885,7 +3887,7 @@
           <p:spPr>
             <a:xfrm>
               <a:off x="5694100" y="2650575"/>
-              <a:ext cx="360000" cy="82800"/>
+              <a:ext cx="360000" cy="79200"/>
             </a:xfrm>
             <a:prstGeom prst="rect">
               <a:avLst/>
@@ -3981,10 +3983,311 @@
           </a:prstGeom>
         </p:spPr>
       </p:pic>
+      <p:pic>
+        <p:nvPicPr>
+          <p:cNvPr id="12" name="Picture 11">
+            <a:extLst>
+              <a:ext uri="{FF2B5EF4-FFF2-40B4-BE49-F238E27FC236}">
+                <a16:creationId xmlns:a16="http://schemas.microsoft.com/office/drawing/2014/main" id="{D9C80F10-C03A-435E-8A1E-B7692FF7488C}"/>
+              </a:ext>
+            </a:extLst>
+          </p:cNvPr>
+          <p:cNvPicPr>
+            <a:picLocks noChangeAspect="1"/>
+          </p:cNvPicPr>
+          <p:nvPr/>
+        </p:nvPicPr>
+        <p:blipFill>
+          <a:blip r:embed="rId5"/>
+          <a:stretch>
+            <a:fillRect/>
+          </a:stretch>
+        </p:blipFill>
+        <p:spPr>
+          <a:xfrm>
+            <a:off x="3393845" y="4624635"/>
+            <a:ext cx="1008000" cy="597460"/>
+          </a:xfrm>
+          <a:prstGeom prst="rect">
+            <a:avLst/>
+          </a:prstGeom>
+        </p:spPr>
+      </p:pic>
+      <p:pic>
+        <p:nvPicPr>
+          <p:cNvPr id="15" name="Picture 14">
+            <a:extLst>
+              <a:ext uri="{FF2B5EF4-FFF2-40B4-BE49-F238E27FC236}">
+                <a16:creationId xmlns:a16="http://schemas.microsoft.com/office/drawing/2014/main" id="{20771C93-1F4D-459E-917C-7AAB3B162DC1}"/>
+              </a:ext>
+            </a:extLst>
+          </p:cNvPr>
+          <p:cNvPicPr>
+            <a:picLocks noChangeAspect="1"/>
+          </p:cNvPicPr>
+          <p:nvPr/>
+        </p:nvPicPr>
+        <p:blipFill>
+          <a:blip r:embed="rId6"/>
+          <a:stretch>
+            <a:fillRect/>
+          </a:stretch>
+        </p:blipFill>
+        <p:spPr>
+          <a:xfrm>
+            <a:off x="3393845" y="5359753"/>
+            <a:ext cx="1005927" cy="597460"/>
+          </a:xfrm>
+          <a:prstGeom prst="rect">
+            <a:avLst/>
+          </a:prstGeom>
+        </p:spPr>
+      </p:pic>
     </p:spTree>
     <p:extLst>
       <p:ext uri="{BB962C8B-B14F-4D97-AF65-F5344CB8AC3E}">
         <p14:creationId xmlns:p14="http://schemas.microsoft.com/office/powerpoint/2010/main" val="2228453491"/>
+      </p:ext>
+    </p:extLst>
+  </p:cSld>
+  <p:clrMapOvr>
+    <a:masterClrMapping/>
+  </p:clrMapOvr>
+</p:sld>
+</file>
+
+<file path=ppt/slides/slide2.xml><?xml version="1.0" encoding="utf-8"?>
+<p:sld xmlns:a="http://schemas.openxmlformats.org/drawingml/2006/main" xmlns:r="http://schemas.openxmlformats.org/officeDocument/2006/relationships" xmlns:p="http://schemas.openxmlformats.org/presentationml/2006/main">
+  <p:cSld>
+    <p:spTree>
+      <p:nvGrpSpPr>
+        <p:cNvPr id="1" name=""/>
+        <p:cNvGrpSpPr/>
+        <p:nvPr/>
+      </p:nvGrpSpPr>
+      <p:grpSpPr>
+        <a:xfrm>
+          <a:off x="0" y="0"/>
+          <a:ext cx="0" cy="0"/>
+          <a:chOff x="0" y="0"/>
+          <a:chExt cx="0" cy="0"/>
+        </a:xfrm>
+      </p:grpSpPr>
+      <p:pic>
+        <p:nvPicPr>
+          <p:cNvPr id="4" name="Picture 3">
+            <a:extLst>
+              <a:ext uri="{FF2B5EF4-FFF2-40B4-BE49-F238E27FC236}">
+                <a16:creationId xmlns:a16="http://schemas.microsoft.com/office/drawing/2014/main" id="{2E12BAA0-ADE1-49F2-BD64-F964C98482B2}"/>
+              </a:ext>
+            </a:extLst>
+          </p:cNvPr>
+          <p:cNvPicPr>
+            <a:picLocks noChangeAspect="1"/>
+          </p:cNvPicPr>
+          <p:nvPr/>
+        </p:nvPicPr>
+        <p:blipFill>
+          <a:blip r:embed="rId2"/>
+          <a:stretch>
+            <a:fillRect/>
+          </a:stretch>
+        </p:blipFill>
+        <p:spPr>
+          <a:xfrm>
+            <a:off x="232691" y="267846"/>
+            <a:ext cx="6322307" cy="6322307"/>
+          </a:xfrm>
+          <a:prstGeom prst="rect">
+            <a:avLst/>
+          </a:prstGeom>
+        </p:spPr>
+      </p:pic>
+      <p:sp>
+        <p:nvSpPr>
+          <p:cNvPr id="5" name="Rectangle 4">
+            <a:extLst>
+              <a:ext uri="{FF2B5EF4-FFF2-40B4-BE49-F238E27FC236}">
+                <a16:creationId xmlns:a16="http://schemas.microsoft.com/office/drawing/2014/main" id="{4D895E78-DD98-4E04-B65F-D315C2888D0E}"/>
+              </a:ext>
+            </a:extLst>
+          </p:cNvPr>
+          <p:cNvSpPr/>
+          <p:nvPr/>
+        </p:nvSpPr>
+        <p:spPr>
+          <a:xfrm>
+            <a:off x="1285875" y="1533525"/>
+            <a:ext cx="3981450" cy="3981450"/>
+          </a:xfrm>
+          <a:prstGeom prst="rect">
+            <a:avLst/>
+          </a:prstGeom>
+        </p:spPr>
+        <p:style>
+          <a:lnRef idx="2">
+            <a:schemeClr val="accent1">
+              <a:shade val="50000"/>
+            </a:schemeClr>
+          </a:lnRef>
+          <a:fillRef idx="1">
+            <a:schemeClr val="accent1"/>
+          </a:fillRef>
+          <a:effectRef idx="0">
+            <a:schemeClr val="accent1"/>
+          </a:effectRef>
+          <a:fontRef idx="minor">
+            <a:schemeClr val="lt1"/>
+          </a:fontRef>
+        </p:style>
+        <p:txBody>
+          <a:bodyPr rtlCol="0" anchor="ctr"/>
+          <a:lstStyle/>
+          <a:p>
+            <a:pPr algn="ctr"/>
+            <a:endParaRPr lang="en-US"/>
+          </a:p>
+        </p:txBody>
+      </p:sp>
+    </p:spTree>
+    <p:extLst>
+      <p:ext uri="{BB962C8B-B14F-4D97-AF65-F5344CB8AC3E}">
+        <p14:creationId xmlns:p14="http://schemas.microsoft.com/office/powerpoint/2010/main" val="1706483291"/>
+      </p:ext>
+    </p:extLst>
+  </p:cSld>
+  <p:clrMapOvr>
+    <a:masterClrMapping/>
+  </p:clrMapOvr>
+</p:sld>
+</file>
+
+<file path=ppt/slides/slide3.xml><?xml version="1.0" encoding="utf-8"?>
+<p:sld xmlns:a="http://schemas.openxmlformats.org/drawingml/2006/main" xmlns:r="http://schemas.openxmlformats.org/officeDocument/2006/relationships" xmlns:p="http://schemas.openxmlformats.org/presentationml/2006/main">
+  <p:cSld>
+    <p:spTree>
+      <p:nvGrpSpPr>
+        <p:cNvPr id="1" name=""/>
+        <p:cNvGrpSpPr/>
+        <p:nvPr/>
+      </p:nvGrpSpPr>
+      <p:grpSpPr>
+        <a:xfrm>
+          <a:off x="0" y="0"/>
+          <a:ext cx="0" cy="0"/>
+          <a:chOff x="0" y="0"/>
+          <a:chExt cx="0" cy="0"/>
+        </a:xfrm>
+      </p:grpSpPr>
+      <p:pic>
+        <p:nvPicPr>
+          <p:cNvPr id="5" name="Picture 4">
+            <a:extLst>
+              <a:ext uri="{FF2B5EF4-FFF2-40B4-BE49-F238E27FC236}">
+                <a16:creationId xmlns:a16="http://schemas.microsoft.com/office/drawing/2014/main" id="{CD0CD3BA-2822-46CD-A607-A091DE8EE693}"/>
+              </a:ext>
+            </a:extLst>
+          </p:cNvPr>
+          <p:cNvPicPr>
+            <a:picLocks noChangeAspect="1"/>
+          </p:cNvPicPr>
+          <p:nvPr/>
+        </p:nvPicPr>
+        <p:blipFill>
+          <a:blip r:embed="rId2"/>
+          <a:stretch>
+            <a:fillRect/>
+          </a:stretch>
+        </p:blipFill>
+        <p:spPr>
+          <a:xfrm rot="10800000">
+            <a:off x="6096000" y="4889889"/>
+            <a:ext cx="279346" cy="165574"/>
+          </a:xfrm>
+          <a:prstGeom prst="rect">
+            <a:avLst/>
+          </a:prstGeom>
+        </p:spPr>
+      </p:pic>
+      <p:pic>
+        <p:nvPicPr>
+          <p:cNvPr id="15" name="Picture 14">
+            <a:extLst>
+              <a:ext uri="{FF2B5EF4-FFF2-40B4-BE49-F238E27FC236}">
+                <a16:creationId xmlns:a16="http://schemas.microsoft.com/office/drawing/2014/main" id="{D7F4587F-248B-4962-B371-65D5B66A207F}"/>
+              </a:ext>
+            </a:extLst>
+          </p:cNvPr>
+          <p:cNvPicPr>
+            <a:picLocks noChangeAspect="1"/>
+          </p:cNvPicPr>
+          <p:nvPr/>
+        </p:nvPicPr>
+        <p:blipFill>
+          <a:blip r:embed="rId3">
+            <a:extLst>
+              <a:ext uri="{28A0092B-C50C-407E-A947-70E740481C1C}">
+                <a14:useLocalDpi xmlns:a14="http://schemas.microsoft.com/office/drawing/2010/main" val="0"/>
+              </a:ext>
+            </a:extLst>
+          </a:blip>
+          <a:stretch>
+            <a:fillRect/>
+          </a:stretch>
+        </p:blipFill>
+        <p:spPr>
+          <a:xfrm>
+            <a:off x="1419744" y="249557"/>
+            <a:ext cx="3286029" cy="5841830"/>
+          </a:xfrm>
+          <a:prstGeom prst="rect">
+            <a:avLst/>
+          </a:prstGeom>
+          <a:ln w="12700">
+            <a:solidFill>
+              <a:schemeClr val="tx1"/>
+            </a:solidFill>
+          </a:ln>
+        </p:spPr>
+      </p:pic>
+      <p:pic>
+        <p:nvPicPr>
+          <p:cNvPr id="13" name="Picture 12">
+            <a:extLst>
+              <a:ext uri="{FF2B5EF4-FFF2-40B4-BE49-F238E27FC236}">
+                <a16:creationId xmlns:a16="http://schemas.microsoft.com/office/drawing/2014/main" id="{050C581C-7840-490F-B9DA-F0433247B00E}"/>
+              </a:ext>
+            </a:extLst>
+          </p:cNvPr>
+          <p:cNvPicPr>
+            <a:picLocks noChangeAspect="1"/>
+          </p:cNvPicPr>
+          <p:nvPr/>
+        </p:nvPicPr>
+        <p:blipFill rotWithShape="1">
+          <a:blip r:embed="rId4"/>
+          <a:srcRect t="15541"/>
+          <a:stretch/>
+        </p:blipFill>
+        <p:spPr>
+          <a:xfrm>
+            <a:off x="1419744" y="1171726"/>
+            <a:ext cx="3286029" cy="3326310"/>
+          </a:xfrm>
+          <a:prstGeom prst="rect">
+            <a:avLst/>
+          </a:prstGeom>
+          <a:ln>
+            <a:solidFill>
+              <a:schemeClr val="tx1"/>
+            </a:solidFill>
+          </a:ln>
+        </p:spPr>
+      </p:pic>
+    </p:spTree>
+    <p:extLst>
+      <p:ext uri="{BB962C8B-B14F-4D97-AF65-F5344CB8AC3E}">
+        <p14:creationId xmlns:p14="http://schemas.microsoft.com/office/powerpoint/2010/main" val="2137548677"/>
       </p:ext>
     </p:extLst>
   </p:cSld>

</xml_diff>

<commit_message>
Create a data structure to represent a map and draw the map onto a canvas
</commit_message>
<xml_diff>
--- a/app/src/Tank Images.pptx
+++ b/app/src/Tank Images.pptx
@@ -261,7 +261,7 @@
           <a:p>
             <a:fld id="{6CEAB757-8E6E-4ABD-BC45-881DC5CE9DE2}" type="datetimeFigureOut">
               <a:rPr lang="en-US" smtClean="0"/>
-              <a:t>2018-12-04</a:t>
+              <a:t>2018-12-24</a:t>
             </a:fld>
             <a:endParaRPr lang="en-US"/>
           </a:p>
@@ -459,7 +459,7 @@
           <a:p>
             <a:fld id="{6CEAB757-8E6E-4ABD-BC45-881DC5CE9DE2}" type="datetimeFigureOut">
               <a:rPr lang="en-US" smtClean="0"/>
-              <a:t>2018-12-04</a:t>
+              <a:t>2018-12-24</a:t>
             </a:fld>
             <a:endParaRPr lang="en-US"/>
           </a:p>
@@ -667,7 +667,7 @@
           <a:p>
             <a:fld id="{6CEAB757-8E6E-4ABD-BC45-881DC5CE9DE2}" type="datetimeFigureOut">
               <a:rPr lang="en-US" smtClean="0"/>
-              <a:t>2018-12-04</a:t>
+              <a:t>2018-12-24</a:t>
             </a:fld>
             <a:endParaRPr lang="en-US"/>
           </a:p>
@@ -865,7 +865,7 @@
           <a:p>
             <a:fld id="{6CEAB757-8E6E-4ABD-BC45-881DC5CE9DE2}" type="datetimeFigureOut">
               <a:rPr lang="en-US" smtClean="0"/>
-              <a:t>2018-12-04</a:t>
+              <a:t>2018-12-24</a:t>
             </a:fld>
             <a:endParaRPr lang="en-US"/>
           </a:p>
@@ -1140,7 +1140,7 @@
           <a:p>
             <a:fld id="{6CEAB757-8E6E-4ABD-BC45-881DC5CE9DE2}" type="datetimeFigureOut">
               <a:rPr lang="en-US" smtClean="0"/>
-              <a:t>2018-12-04</a:t>
+              <a:t>2018-12-24</a:t>
             </a:fld>
             <a:endParaRPr lang="en-US"/>
           </a:p>
@@ -1405,7 +1405,7 @@
           <a:p>
             <a:fld id="{6CEAB757-8E6E-4ABD-BC45-881DC5CE9DE2}" type="datetimeFigureOut">
               <a:rPr lang="en-US" smtClean="0"/>
-              <a:t>2018-12-04</a:t>
+              <a:t>2018-12-24</a:t>
             </a:fld>
             <a:endParaRPr lang="en-US"/>
           </a:p>
@@ -1817,7 +1817,7 @@
           <a:p>
             <a:fld id="{6CEAB757-8E6E-4ABD-BC45-881DC5CE9DE2}" type="datetimeFigureOut">
               <a:rPr lang="en-US" smtClean="0"/>
-              <a:t>2018-12-04</a:t>
+              <a:t>2018-12-24</a:t>
             </a:fld>
             <a:endParaRPr lang="en-US"/>
           </a:p>
@@ -1958,7 +1958,7 @@
           <a:p>
             <a:fld id="{6CEAB757-8E6E-4ABD-BC45-881DC5CE9DE2}" type="datetimeFigureOut">
               <a:rPr lang="en-US" smtClean="0"/>
-              <a:t>2018-12-04</a:t>
+              <a:t>2018-12-24</a:t>
             </a:fld>
             <a:endParaRPr lang="en-US"/>
           </a:p>
@@ -2071,7 +2071,7 @@
           <a:p>
             <a:fld id="{6CEAB757-8E6E-4ABD-BC45-881DC5CE9DE2}" type="datetimeFigureOut">
               <a:rPr lang="en-US" smtClean="0"/>
-              <a:t>2018-12-04</a:t>
+              <a:t>2018-12-24</a:t>
             </a:fld>
             <a:endParaRPr lang="en-US"/>
           </a:p>
@@ -2382,7 +2382,7 @@
           <a:p>
             <a:fld id="{6CEAB757-8E6E-4ABD-BC45-881DC5CE9DE2}" type="datetimeFigureOut">
               <a:rPr lang="en-US" smtClean="0"/>
-              <a:t>2018-12-04</a:t>
+              <a:t>2018-12-24</a:t>
             </a:fld>
             <a:endParaRPr lang="en-US"/>
           </a:p>
@@ -2670,7 +2670,7 @@
           <a:p>
             <a:fld id="{6CEAB757-8E6E-4ABD-BC45-881DC5CE9DE2}" type="datetimeFigureOut">
               <a:rPr lang="en-US" smtClean="0"/>
-              <a:t>2018-12-04</a:t>
+              <a:t>2018-12-24</a:t>
             </a:fld>
             <a:endParaRPr lang="en-US"/>
           </a:p>
@@ -2911,7 +2911,7 @@
           <a:p>
             <a:fld id="{6CEAB757-8E6E-4ABD-BC45-881DC5CE9DE2}" type="datetimeFigureOut">
               <a:rPr lang="en-US" smtClean="0"/>
-              <a:t>2018-12-04</a:t>
+              <a:t>2018-12-24</a:t>
             </a:fld>
             <a:endParaRPr lang="en-US"/>
           </a:p>
@@ -3886,7 +3886,7 @@
           </p:nvSpPr>
           <p:spPr>
             <a:xfrm>
-              <a:off x="5694100" y="2650575"/>
+              <a:off x="5694100" y="2646975"/>
               <a:ext cx="360000" cy="79200"/>
             </a:xfrm>
             <a:prstGeom prst="rect">
@@ -4005,8 +4005,8 @@
         </p:blipFill>
         <p:spPr>
           <a:xfrm>
-            <a:off x="3393845" y="4624635"/>
-            <a:ext cx="1008000" cy="597460"/>
+            <a:off x="3393845" y="4660843"/>
+            <a:ext cx="1005928" cy="596232"/>
           </a:xfrm>
           <a:prstGeom prst="rect">
             <a:avLst/>
@@ -4043,6 +4043,58 @@
           </a:prstGeom>
         </p:spPr>
       </p:pic>
+      <p:sp>
+        <p:nvSpPr>
+          <p:cNvPr id="5" name="Rectangle 4">
+            <a:extLst>
+              <a:ext uri="{FF2B5EF4-FFF2-40B4-BE49-F238E27FC236}">
+                <a16:creationId xmlns:a16="http://schemas.microsoft.com/office/drawing/2014/main" id="{75608AEE-A365-405A-A2FA-F30FC1349F2C}"/>
+              </a:ext>
+            </a:extLst>
+          </p:cNvPr>
+          <p:cNvSpPr/>
+          <p:nvPr/>
+        </p:nvSpPr>
+        <p:spPr>
+          <a:xfrm>
+            <a:off x="4399772" y="4883944"/>
+            <a:ext cx="369180" cy="144000"/>
+          </a:xfrm>
+          <a:prstGeom prst="rect">
+            <a:avLst/>
+          </a:prstGeom>
+          <a:solidFill>
+            <a:srgbClr val="00B050"/>
+          </a:solidFill>
+          <a:ln>
+            <a:noFill/>
+          </a:ln>
+        </p:spPr>
+        <p:style>
+          <a:lnRef idx="2">
+            <a:schemeClr val="accent1">
+              <a:shade val="50000"/>
+            </a:schemeClr>
+          </a:lnRef>
+          <a:fillRef idx="1">
+            <a:schemeClr val="accent1"/>
+          </a:fillRef>
+          <a:effectRef idx="0">
+            <a:schemeClr val="accent1"/>
+          </a:effectRef>
+          <a:fontRef idx="minor">
+            <a:schemeClr val="lt1"/>
+          </a:fontRef>
+        </p:style>
+        <p:txBody>
+          <a:bodyPr rtlCol="0" anchor="ctr"/>
+          <a:lstStyle/>
+          <a:p>
+            <a:pPr algn="ctr"/>
+            <a:endParaRPr lang="en-US"/>
+          </a:p>
+        </p:txBody>
+      </p:sp>
     </p:spTree>
     <p:extLst>
       <p:ext uri="{BB962C8B-B14F-4D97-AF65-F5344CB8AC3E}">
@@ -4117,8 +4169,8 @@
         </p:nvSpPr>
         <p:spPr>
           <a:xfrm>
-            <a:off x="1285875" y="1533525"/>
-            <a:ext cx="3981450" cy="3981450"/>
+            <a:off x="1319431" y="1550301"/>
+            <a:ext cx="3960000" cy="4363937"/>
           </a:xfrm>
           <a:prstGeom prst="rect">
             <a:avLst/>
@@ -4181,10 +4233,10 @@
       </p:grpSpPr>
       <p:pic>
         <p:nvPicPr>
-          <p:cNvPr id="5" name="Picture 4">
-            <a:extLst>
-              <a:ext uri="{FF2B5EF4-FFF2-40B4-BE49-F238E27FC236}">
-                <a16:creationId xmlns:a16="http://schemas.microsoft.com/office/drawing/2014/main" id="{CD0CD3BA-2822-46CD-A607-A091DE8EE693}"/>
+          <p:cNvPr id="2" name="Picture 1">
+            <a:extLst>
+              <a:ext uri="{FF2B5EF4-FFF2-40B4-BE49-F238E27FC236}">
+                <a16:creationId xmlns:a16="http://schemas.microsoft.com/office/drawing/2014/main" id="{708C5251-9DA7-4F69-A4CA-80EEAE0B7616}"/>
               </a:ext>
             </a:extLst>
           </p:cNvPr>
@@ -4200,8 +4252,38 @@
           </a:stretch>
         </p:blipFill>
         <p:spPr>
+          <a:xfrm>
+            <a:off x="6235672" y="766620"/>
+            <a:ext cx="5424926" cy="2839894"/>
+          </a:xfrm>
+          <a:prstGeom prst="rect">
+            <a:avLst/>
+          </a:prstGeom>
+        </p:spPr>
+      </p:pic>
+      <p:pic>
+        <p:nvPicPr>
+          <p:cNvPr id="5" name="Picture 4">
+            <a:extLst>
+              <a:ext uri="{FF2B5EF4-FFF2-40B4-BE49-F238E27FC236}">
+                <a16:creationId xmlns:a16="http://schemas.microsoft.com/office/drawing/2014/main" id="{CD0CD3BA-2822-46CD-A607-A091DE8EE693}"/>
+              </a:ext>
+            </a:extLst>
+          </p:cNvPr>
+          <p:cNvPicPr>
+            <a:picLocks noChangeAspect="1"/>
+          </p:cNvPicPr>
+          <p:nvPr/>
+        </p:nvPicPr>
+        <p:blipFill>
+          <a:blip r:embed="rId3"/>
+          <a:stretch>
+            <a:fillRect/>
+          </a:stretch>
+        </p:blipFill>
+        <p:spPr>
           <a:xfrm rot="10800000">
-            <a:off x="6096000" y="4889889"/>
+            <a:off x="5983326" y="4482362"/>
             <a:ext cx="279346" cy="165574"/>
           </a:xfrm>
           <a:prstGeom prst="rect">
@@ -4224,7 +4306,7 @@
           <p:nvPr/>
         </p:nvPicPr>
         <p:blipFill>
-          <a:blip r:embed="rId3">
+          <a:blip r:embed="rId4">
             <a:extLst>
               <a:ext uri="{28A0092B-C50C-407E-A947-70E740481C1C}">
                 <a14:useLocalDpi xmlns:a14="http://schemas.microsoft.com/office/drawing/2010/main" val="0"/>
@@ -4265,13 +4347,13 @@
           <p:nvPr/>
         </p:nvPicPr>
         <p:blipFill rotWithShape="1">
-          <a:blip r:embed="rId4"/>
+          <a:blip r:embed="rId5"/>
           <a:srcRect t="15541"/>
           <a:stretch/>
         </p:blipFill>
         <p:spPr>
           <a:xfrm>
-            <a:off x="1419744" y="1171726"/>
+            <a:off x="1419743" y="1238839"/>
             <a:ext cx="3286029" cy="3326310"/>
           </a:xfrm>
           <a:prstGeom prst="rect">

</xml_diff>